<commit_message>
add SE material to intro slides
</commit_message>
<xml_diff>
--- a/slides/intro.pptx
+++ b/slides/intro.pptx
@@ -6,7 +6,7 @@
     <p:sldMasterId id="2147483650" r:id="rId2"/>
   </p:sldMasterIdLst>
   <p:notesMasterIdLst>
-    <p:notesMasterId r:id="rId13"/>
+    <p:notesMasterId r:id="rId21"/>
   </p:notesMasterIdLst>
   <p:sldIdLst>
     <p:sldId id="262" r:id="rId3"/>
@@ -19,6 +19,14 @@
     <p:sldId id="318" r:id="rId10"/>
     <p:sldId id="319" r:id="rId11"/>
     <p:sldId id="310" r:id="rId12"/>
+    <p:sldId id="324" r:id="rId13"/>
+    <p:sldId id="326" r:id="rId14"/>
+    <p:sldId id="320" r:id="rId15"/>
+    <p:sldId id="321" r:id="rId16"/>
+    <p:sldId id="322" r:id="rId17"/>
+    <p:sldId id="323" r:id="rId18"/>
+    <p:sldId id="325" r:id="rId19"/>
+    <p:sldId id="327" r:id="rId20"/>
   </p:sldIdLst>
   <p:sldSz cx="14630400" cy="8229600"/>
   <p:notesSz cx="6858000" cy="9144000"/>
@@ -132,6 +140,14 @@
             <p14:sldId id="318"/>
             <p14:sldId id="319"/>
             <p14:sldId id="310"/>
+            <p14:sldId id="324"/>
+            <p14:sldId id="326"/>
+            <p14:sldId id="320"/>
+            <p14:sldId id="321"/>
+            <p14:sldId id="322"/>
+            <p14:sldId id="323"/>
+            <p14:sldId id="325"/>
+            <p14:sldId id="327"/>
           </p14:sldIdLst>
         </p14:section>
       </p14:sectionLst>
@@ -222,7 +238,7 @@
           <a:p>
             <a:fld id="{9C247A12-7B99-F147-B048-833836355128}" type="datetimeFigureOut">
               <a:rPr lang="en-US" smtClean="0"/>
-              <a:t>8/10/15</a:t>
+              <a:t>8/19/15</a:t>
             </a:fld>
             <a:endParaRPr lang="en-US"/>
           </a:p>
@@ -3569,6 +3585,1010 @@
 </p:sld>
 </file>
 
+<file path=ppt/slides/slide11.xml><?xml version="1.0" encoding="utf-8"?>
+<p:sld xmlns:a="http://schemas.openxmlformats.org/drawingml/2006/main" xmlns:r="http://schemas.openxmlformats.org/officeDocument/2006/relationships" xmlns:p="http://schemas.openxmlformats.org/presentationml/2006/main">
+  <p:cSld>
+    <p:spTree>
+      <p:nvGrpSpPr>
+        <p:cNvPr id="1" name=""/>
+        <p:cNvGrpSpPr/>
+        <p:nvPr/>
+      </p:nvGrpSpPr>
+      <p:grpSpPr>
+        <a:xfrm>
+          <a:off x="0" y="0"/>
+          <a:ext cx="0" cy="0"/>
+          <a:chOff x="0" y="0"/>
+          <a:chExt cx="0" cy="0"/>
+        </a:xfrm>
+      </p:grpSpPr>
+      <p:sp>
+        <p:nvSpPr>
+          <p:cNvPr id="2" name="Title 1"/>
+          <p:cNvSpPr>
+            <a:spLocks noGrp="1"/>
+          </p:cNvSpPr>
+          <p:nvPr>
+            <p:ph type="title"/>
+          </p:nvPr>
+        </p:nvSpPr>
+        <p:spPr/>
+        <p:txBody>
+          <a:bodyPr/>
+          <a:lstStyle/>
+          <a:p>
+            <a:r>
+              <a:rPr lang="en-US" dirty="0" smtClean="0"/>
+              <a:t>Twitter – Service Oriented Architecture (SOA)</a:t>
+            </a:r>
+            <a:endParaRPr lang="en-US" dirty="0"/>
+          </a:p>
+        </p:txBody>
+      </p:sp>
+      <p:pic>
+        <p:nvPicPr>
+          <p:cNvPr id="4" name="Picture 3" descr="twitter.png"/>
+          <p:cNvPicPr>
+            <a:picLocks noChangeAspect="1"/>
+          </p:cNvPicPr>
+          <p:nvPr/>
+        </p:nvPicPr>
+        <p:blipFill>
+          <a:blip r:embed="rId2">
+            <a:extLst>
+              <a:ext uri="{28A0092B-C50C-407E-A947-70E740481C1C}">
+                <a14:useLocalDpi xmlns:a14="http://schemas.microsoft.com/office/drawing/2010/main" val="0"/>
+              </a:ext>
+            </a:extLst>
+          </a:blip>
+          <a:stretch>
+            <a:fillRect/>
+          </a:stretch>
+        </p:blipFill>
+        <p:spPr>
+          <a:xfrm>
+            <a:off x="3615566" y="1232650"/>
+            <a:ext cx="7399268" cy="6161848"/>
+          </a:xfrm>
+          <a:prstGeom prst="rect">
+            <a:avLst/>
+          </a:prstGeom>
+        </p:spPr>
+      </p:pic>
+    </p:spTree>
+    <p:extLst>
+      <p:ext uri="{BB962C8B-B14F-4D97-AF65-F5344CB8AC3E}">
+        <p14:creationId xmlns:p14="http://schemas.microsoft.com/office/powerpoint/2010/main" val="41582812"/>
+      </p:ext>
+    </p:extLst>
+  </p:cSld>
+  <p:clrMapOvr>
+    <a:masterClrMapping/>
+  </p:clrMapOvr>
+</p:sld>
+</file>
+
+<file path=ppt/slides/slide12.xml><?xml version="1.0" encoding="utf-8"?>
+<p:sld xmlns:a="http://schemas.openxmlformats.org/drawingml/2006/main" xmlns:r="http://schemas.openxmlformats.org/officeDocument/2006/relationships" xmlns:p="http://schemas.openxmlformats.org/presentationml/2006/main">
+  <p:cSld>
+    <p:spTree>
+      <p:nvGrpSpPr>
+        <p:cNvPr id="1" name=""/>
+        <p:cNvGrpSpPr/>
+        <p:nvPr/>
+      </p:nvGrpSpPr>
+      <p:grpSpPr>
+        <a:xfrm>
+          <a:off x="0" y="0"/>
+          <a:ext cx="0" cy="0"/>
+          <a:chOff x="0" y="0"/>
+          <a:chExt cx="0" cy="0"/>
+        </a:xfrm>
+      </p:grpSpPr>
+      <p:sp>
+        <p:nvSpPr>
+          <p:cNvPr id="2" name="Title 1"/>
+          <p:cNvSpPr>
+            <a:spLocks noGrp="1"/>
+          </p:cNvSpPr>
+          <p:nvPr>
+            <p:ph type="title"/>
+          </p:nvPr>
+        </p:nvSpPr>
+        <p:spPr/>
+        <p:txBody>
+          <a:bodyPr/>
+          <a:lstStyle/>
+          <a:p>
+            <a:r>
+              <a:rPr lang="en-US" dirty="0" smtClean="0"/>
+              <a:t>Amazon – Original SOA</a:t>
+            </a:r>
+            <a:endParaRPr lang="en-US" dirty="0"/>
+          </a:p>
+        </p:txBody>
+      </p:sp>
+      <p:pic>
+        <p:nvPicPr>
+          <p:cNvPr id="4" name="Picture 3" descr="Screen Shot 2015-08-19 at 6.15.12 PM.png"/>
+          <p:cNvPicPr>
+            <a:picLocks noChangeAspect="1"/>
+          </p:cNvPicPr>
+          <p:nvPr/>
+        </p:nvPicPr>
+        <p:blipFill>
+          <a:blip r:embed="rId2">
+            <a:extLst>
+              <a:ext uri="{28A0092B-C50C-407E-A947-70E740481C1C}">
+                <a14:useLocalDpi xmlns:a14="http://schemas.microsoft.com/office/drawing/2010/main" val="0"/>
+              </a:ext>
+            </a:extLst>
+          </a:blip>
+          <a:stretch>
+            <a:fillRect/>
+          </a:stretch>
+        </p:blipFill>
+        <p:spPr>
+          <a:xfrm>
+            <a:off x="4152169" y="1190921"/>
+            <a:ext cx="6326062" cy="6200506"/>
+          </a:xfrm>
+          <a:prstGeom prst="rect">
+            <a:avLst/>
+          </a:prstGeom>
+        </p:spPr>
+      </p:pic>
+    </p:spTree>
+    <p:extLst>
+      <p:ext uri="{BB962C8B-B14F-4D97-AF65-F5344CB8AC3E}">
+        <p14:creationId xmlns:p14="http://schemas.microsoft.com/office/powerpoint/2010/main" val="1645058582"/>
+      </p:ext>
+    </p:extLst>
+  </p:cSld>
+  <p:clrMapOvr>
+    <a:masterClrMapping/>
+  </p:clrMapOvr>
+</p:sld>
+</file>
+
+<file path=ppt/slides/slide13.xml><?xml version="1.0" encoding="utf-8"?>
+<p:sld xmlns:a="http://schemas.openxmlformats.org/drawingml/2006/main" xmlns:r="http://schemas.openxmlformats.org/officeDocument/2006/relationships" xmlns:p="http://schemas.openxmlformats.org/presentationml/2006/main">
+  <p:cSld>
+    <p:spTree>
+      <p:nvGrpSpPr>
+        <p:cNvPr id="1" name=""/>
+        <p:cNvGrpSpPr/>
+        <p:nvPr/>
+      </p:nvGrpSpPr>
+      <p:grpSpPr>
+        <a:xfrm>
+          <a:off x="0" y="0"/>
+          <a:ext cx="0" cy="0"/>
+          <a:chOff x="0" y="0"/>
+          <a:chExt cx="0" cy="0"/>
+        </a:xfrm>
+      </p:grpSpPr>
+      <p:sp>
+        <p:nvSpPr>
+          <p:cNvPr id="2" name="Title 1"/>
+          <p:cNvSpPr>
+            <a:spLocks noGrp="1"/>
+          </p:cNvSpPr>
+          <p:nvPr>
+            <p:ph type="title"/>
+          </p:nvPr>
+        </p:nvSpPr>
+        <p:spPr/>
+        <p:txBody>
+          <a:bodyPr/>
+          <a:lstStyle/>
+          <a:p>
+            <a:r>
+              <a:rPr lang="en-US" dirty="0" smtClean="0"/>
+              <a:t>Software Engineering</a:t>
+            </a:r>
+            <a:endParaRPr lang="en-US" dirty="0"/>
+          </a:p>
+        </p:txBody>
+      </p:sp>
+      <p:sp>
+        <p:nvSpPr>
+          <p:cNvPr id="4" name="Text Placeholder 3"/>
+          <p:cNvSpPr>
+            <a:spLocks noGrp="1"/>
+          </p:cNvSpPr>
+          <p:nvPr>
+            <p:ph type="body" sz="quarter" idx="10"/>
+          </p:nvPr>
+        </p:nvSpPr>
+        <p:spPr/>
+        <p:txBody>
+          <a:bodyPr/>
+          <a:lstStyle/>
+          <a:p>
+            <a:pPr marL="342900" indent="-342900">
+              <a:buFont typeface="Arial"/>
+              <a:buChar char="•"/>
+            </a:pPr>
+            <a:r>
+              <a:rPr lang="en-US" dirty="0" smtClean="0"/>
+              <a:t>There are many examples of failed software projects</a:t>
+            </a:r>
+          </a:p>
+          <a:p>
+            <a:pPr marL="852488" lvl="3" indent="-342900"/>
+            <a:r>
+              <a:rPr lang="en-US" dirty="0" smtClean="0"/>
+              <a:t>Affordable care act website</a:t>
+            </a:r>
+          </a:p>
+          <a:p>
+            <a:pPr marL="852488" lvl="3" indent="-342900"/>
+            <a:r>
+              <a:rPr lang="en-US" dirty="0" smtClean="0"/>
+              <a:t>Therac-25 radiation therapy machine killed patients because of a bug</a:t>
+            </a:r>
+          </a:p>
+          <a:p>
+            <a:pPr marL="852488" lvl="3" indent="-342900"/>
+            <a:endParaRPr lang="en-US" dirty="0"/>
+          </a:p>
+          <a:p>
+            <a:pPr marL="342900" lvl="2" indent="-342900"/>
+            <a:r>
+              <a:rPr lang="en-US" dirty="0" smtClean="0"/>
+              <a:t>Software Engineering</a:t>
+            </a:r>
+          </a:p>
+          <a:p>
+            <a:pPr marL="852488" lvl="3" indent="-342900"/>
+            <a:r>
+              <a:rPr lang="en-US" dirty="0" smtClean="0"/>
+              <a:t>Term coined in 1969. Discover more structured methods for building software.</a:t>
+            </a:r>
+          </a:p>
+          <a:p>
+            <a:pPr marL="852488" lvl="3" indent="-342900"/>
+            <a:endParaRPr lang="en-US" dirty="0" smtClean="0"/>
+          </a:p>
+          <a:p>
+            <a:pPr marL="852488" lvl="3" indent="-342900"/>
+            <a:endParaRPr lang="en-US" dirty="0"/>
+          </a:p>
+          <a:p>
+            <a:pPr marL="342900" lvl="2" indent="-342900"/>
+            <a:r>
+              <a:rPr lang="en-US" dirty="0" smtClean="0"/>
+              <a:t>Also see “Engineering Software as a Service: An Agile Approach Using Cloud Computing” by Fox and Patterson</a:t>
+            </a:r>
+            <a:endParaRPr lang="en-US" dirty="0"/>
+          </a:p>
+          <a:p>
+            <a:pPr marL="342900" lvl="2" indent="-342900"/>
+            <a:endParaRPr lang="en-US" dirty="0" smtClean="0"/>
+          </a:p>
+          <a:p>
+            <a:pPr marL="852488" lvl="3" indent="-342900"/>
+            <a:endParaRPr lang="en-US" dirty="0"/>
+          </a:p>
+        </p:txBody>
+      </p:sp>
+    </p:spTree>
+    <p:extLst>
+      <p:ext uri="{BB962C8B-B14F-4D97-AF65-F5344CB8AC3E}">
+        <p14:creationId xmlns:p14="http://schemas.microsoft.com/office/powerpoint/2010/main" val="3641403198"/>
+      </p:ext>
+    </p:extLst>
+  </p:cSld>
+  <p:clrMapOvr>
+    <a:masterClrMapping/>
+  </p:clrMapOvr>
+</p:sld>
+</file>
+
+<file path=ppt/slides/slide14.xml><?xml version="1.0" encoding="utf-8"?>
+<p:sld xmlns:a="http://schemas.openxmlformats.org/drawingml/2006/main" xmlns:r="http://schemas.openxmlformats.org/officeDocument/2006/relationships" xmlns:p="http://schemas.openxmlformats.org/presentationml/2006/main">
+  <p:cSld>
+    <p:spTree>
+      <p:nvGrpSpPr>
+        <p:cNvPr id="1" name=""/>
+        <p:cNvGrpSpPr/>
+        <p:nvPr/>
+      </p:nvGrpSpPr>
+      <p:grpSpPr>
+        <a:xfrm>
+          <a:off x="0" y="0"/>
+          <a:ext cx="0" cy="0"/>
+          <a:chOff x="0" y="0"/>
+          <a:chExt cx="0" cy="0"/>
+        </a:xfrm>
+      </p:grpSpPr>
+      <p:sp>
+        <p:nvSpPr>
+          <p:cNvPr id="2" name="Title 1"/>
+          <p:cNvSpPr>
+            <a:spLocks noGrp="1"/>
+          </p:cNvSpPr>
+          <p:nvPr>
+            <p:ph type="title"/>
+          </p:nvPr>
+        </p:nvSpPr>
+        <p:spPr/>
+        <p:txBody>
+          <a:bodyPr/>
+          <a:lstStyle/>
+          <a:p>
+            <a:r>
+              <a:rPr lang="en-US" dirty="0" smtClean="0"/>
+              <a:t>Waterfall – 1970s</a:t>
+            </a:r>
+            <a:endParaRPr lang="en-US" dirty="0"/>
+          </a:p>
+        </p:txBody>
+      </p:sp>
+      <p:sp>
+        <p:nvSpPr>
+          <p:cNvPr id="5" name="Text Placeholder 4"/>
+          <p:cNvSpPr>
+            <a:spLocks noGrp="1"/>
+          </p:cNvSpPr>
+          <p:nvPr>
+            <p:ph type="body" sz="quarter" idx="10"/>
+          </p:nvPr>
+        </p:nvSpPr>
+        <p:spPr/>
+        <p:txBody>
+          <a:bodyPr/>
+          <a:lstStyle/>
+          <a:p>
+            <a:pPr marL="342900" indent="-342900">
+              <a:buFont typeface="Arial"/>
+              <a:buChar char="•"/>
+            </a:pPr>
+            <a:r>
+              <a:rPr lang="en-US" dirty="0" smtClean="0"/>
+              <a:t>Each phase happens once</a:t>
+            </a:r>
+          </a:p>
+          <a:p>
+            <a:pPr marL="342900" indent="-342900">
+              <a:buFont typeface="Arial"/>
+              <a:buChar char="•"/>
+            </a:pPr>
+            <a:endParaRPr lang="en-US" dirty="0"/>
+          </a:p>
+          <a:p>
+            <a:pPr marL="342900" indent="-342900">
+              <a:buFont typeface="Arial"/>
+              <a:buChar char="•"/>
+            </a:pPr>
+            <a:r>
+              <a:rPr lang="en-US" dirty="0" smtClean="0"/>
+              <a:t>Good for projects that require a lot of planning</a:t>
+            </a:r>
+          </a:p>
+          <a:p>
+            <a:pPr marL="852488" lvl="3" indent="-342900"/>
+            <a:r>
+              <a:rPr lang="en-US" dirty="0"/>
+              <a:t>NASA </a:t>
+            </a:r>
+            <a:r>
+              <a:rPr lang="en-US" dirty="0" smtClean="0"/>
+              <a:t>applications</a:t>
+            </a:r>
+          </a:p>
+          <a:p>
+            <a:pPr marL="852488" lvl="3" indent="-342900"/>
+            <a:endParaRPr lang="en-US" dirty="0"/>
+          </a:p>
+          <a:p>
+            <a:pPr marL="342900" lvl="2" indent="-342900"/>
+            <a:r>
+              <a:rPr lang="en-US" dirty="0"/>
+              <a:t>“</a:t>
+            </a:r>
+            <a:r>
+              <a:rPr lang="en-US" i="1" dirty="0"/>
+              <a:t>Plan to throw one [implementation] away; you will, anyhow.”</a:t>
+            </a:r>
+            <a:r>
+              <a:rPr lang="en-US" dirty="0"/>
+              <a:t>  -Fred Brooks, Jr.</a:t>
+            </a:r>
+          </a:p>
+          <a:p>
+            <a:pPr marL="342900" lvl="1" indent="-342900">
+              <a:buFont typeface="Arial"/>
+              <a:buChar char="•"/>
+            </a:pPr>
+            <a:endParaRPr lang="en-US" dirty="0" smtClean="0"/>
+          </a:p>
+          <a:p>
+            <a:pPr marL="342900" indent="-342900">
+              <a:buFont typeface="Arial"/>
+              <a:buChar char="•"/>
+            </a:pPr>
+            <a:r>
+              <a:rPr lang="en-US" dirty="0" smtClean="0"/>
+              <a:t>Need user/client in the loop</a:t>
+            </a:r>
+          </a:p>
+          <a:p>
+            <a:pPr marL="852488" lvl="3" indent="-342900"/>
+            <a:r>
+              <a:rPr lang="en-US" dirty="0" smtClean="0"/>
+              <a:t>Early prototypes</a:t>
+            </a:r>
+          </a:p>
+        </p:txBody>
+      </p:sp>
+      <p:pic>
+        <p:nvPicPr>
+          <p:cNvPr id="4" name="Picture 3" descr="350px-Waterfall_model.svg.png"/>
+          <p:cNvPicPr>
+            <a:picLocks noChangeAspect="1"/>
+          </p:cNvPicPr>
+          <p:nvPr/>
+        </p:nvPicPr>
+        <p:blipFill>
+          <a:blip r:embed="rId2">
+            <a:extLst>
+              <a:ext uri="{28A0092B-C50C-407E-A947-70E740481C1C}">
+                <a14:useLocalDpi xmlns:a14="http://schemas.microsoft.com/office/drawing/2010/main" val="0"/>
+              </a:ext>
+            </a:extLst>
+          </a:blip>
+          <a:stretch>
+            <a:fillRect/>
+          </a:stretch>
+        </p:blipFill>
+        <p:spPr>
+          <a:xfrm>
+            <a:off x="8505263" y="2007734"/>
+            <a:ext cx="4445000" cy="3340100"/>
+          </a:xfrm>
+          <a:prstGeom prst="rect">
+            <a:avLst/>
+          </a:prstGeom>
+        </p:spPr>
+      </p:pic>
+    </p:spTree>
+    <p:extLst>
+      <p:ext uri="{BB962C8B-B14F-4D97-AF65-F5344CB8AC3E}">
+        <p14:creationId xmlns:p14="http://schemas.microsoft.com/office/powerpoint/2010/main" val="568789549"/>
+      </p:ext>
+    </p:extLst>
+  </p:cSld>
+  <p:clrMapOvr>
+    <a:masterClrMapping/>
+  </p:clrMapOvr>
+</p:sld>
+</file>
+
+<file path=ppt/slides/slide15.xml><?xml version="1.0" encoding="utf-8"?>
+<p:sld xmlns:a="http://schemas.openxmlformats.org/drawingml/2006/main" xmlns:r="http://schemas.openxmlformats.org/officeDocument/2006/relationships" xmlns:p="http://schemas.openxmlformats.org/presentationml/2006/main">
+  <p:cSld>
+    <p:spTree>
+      <p:nvGrpSpPr>
+        <p:cNvPr id="1" name=""/>
+        <p:cNvGrpSpPr/>
+        <p:nvPr/>
+      </p:nvGrpSpPr>
+      <p:grpSpPr>
+        <a:xfrm>
+          <a:off x="0" y="0"/>
+          <a:ext cx="0" cy="0"/>
+          <a:chOff x="0" y="0"/>
+          <a:chExt cx="0" cy="0"/>
+        </a:xfrm>
+      </p:grpSpPr>
+      <p:sp>
+        <p:nvSpPr>
+          <p:cNvPr id="2" name="Title 1"/>
+          <p:cNvSpPr>
+            <a:spLocks noGrp="1"/>
+          </p:cNvSpPr>
+          <p:nvPr>
+            <p:ph type="title"/>
+          </p:nvPr>
+        </p:nvSpPr>
+        <p:spPr/>
+        <p:txBody>
+          <a:bodyPr/>
+          <a:lstStyle/>
+          <a:p>
+            <a:r>
+              <a:rPr lang="en-US" dirty="0" smtClean="0"/>
+              <a:t>Spiral – 1980s</a:t>
+            </a:r>
+            <a:endParaRPr lang="en-US" dirty="0"/>
+          </a:p>
+        </p:txBody>
+      </p:sp>
+      <p:sp>
+        <p:nvSpPr>
+          <p:cNvPr id="5" name="Text Placeholder 4"/>
+          <p:cNvSpPr>
+            <a:spLocks noGrp="1"/>
+          </p:cNvSpPr>
+          <p:nvPr>
+            <p:ph type="body" sz="quarter" idx="10"/>
+          </p:nvPr>
+        </p:nvSpPr>
+        <p:spPr/>
+        <p:txBody>
+          <a:bodyPr/>
+          <a:lstStyle/>
+          <a:p>
+            <a:pPr marL="342900" indent="-342900">
+              <a:buFont typeface="Arial"/>
+              <a:buChar char="•"/>
+            </a:pPr>
+            <a:r>
+              <a:rPr lang="en-US" dirty="0" smtClean="0"/>
+              <a:t>Develop prototypes</a:t>
+            </a:r>
+          </a:p>
+          <a:p>
+            <a:pPr marL="342900" indent="-342900">
+              <a:buFont typeface="Arial"/>
+              <a:buChar char="•"/>
+            </a:pPr>
+            <a:endParaRPr lang="en-US" dirty="0"/>
+          </a:p>
+          <a:p>
+            <a:pPr marL="342900" indent="-342900">
+              <a:buFont typeface="Arial"/>
+              <a:buChar char="•"/>
+            </a:pPr>
+            <a:r>
+              <a:rPr lang="en-US" dirty="0" smtClean="0"/>
+              <a:t>Consult client</a:t>
+            </a:r>
+          </a:p>
+          <a:p>
+            <a:pPr marL="342900" indent="-342900">
+              <a:buFont typeface="Arial"/>
+              <a:buChar char="•"/>
+            </a:pPr>
+            <a:endParaRPr lang="en-US" dirty="0"/>
+          </a:p>
+          <a:p>
+            <a:pPr marL="342900" indent="-342900">
+              <a:buFont typeface="Arial"/>
+              <a:buChar char="•"/>
+            </a:pPr>
+            <a:r>
+              <a:rPr lang="en-US" dirty="0" smtClean="0"/>
+              <a:t>Iterate</a:t>
+            </a:r>
+          </a:p>
+          <a:p>
+            <a:pPr marL="342900" indent="-342900">
+              <a:buFont typeface="Arial"/>
+              <a:buChar char="•"/>
+            </a:pPr>
+            <a:endParaRPr lang="en-US" dirty="0"/>
+          </a:p>
+          <a:p>
+            <a:pPr marL="342900" indent="-342900">
+              <a:buFont typeface="Arial"/>
+              <a:buChar char="•"/>
+            </a:pPr>
+            <a:r>
+              <a:rPr lang="en-US" dirty="0" smtClean="0"/>
+              <a:t>Iterations 6-24 months long</a:t>
+            </a:r>
+            <a:endParaRPr lang="en-US" dirty="0"/>
+          </a:p>
+        </p:txBody>
+      </p:sp>
+      <p:pic>
+        <p:nvPicPr>
+          <p:cNvPr id="6" name="Picture 5" descr="600px-Spiral_model_(Boehm,_1988).svg.png"/>
+          <p:cNvPicPr>
+            <a:picLocks noChangeAspect="1"/>
+          </p:cNvPicPr>
+          <p:nvPr/>
+        </p:nvPicPr>
+        <p:blipFill>
+          <a:blip r:embed="rId2">
+            <a:extLst>
+              <a:ext uri="{28A0092B-C50C-407E-A947-70E740481C1C}">
+                <a14:useLocalDpi xmlns:a14="http://schemas.microsoft.com/office/drawing/2010/main" val="0"/>
+              </a:ext>
+            </a:extLst>
+          </a:blip>
+          <a:stretch>
+            <a:fillRect/>
+          </a:stretch>
+        </p:blipFill>
+        <p:spPr>
+          <a:xfrm>
+            <a:off x="6718974" y="1345902"/>
+            <a:ext cx="6770005" cy="5641671"/>
+          </a:xfrm>
+          <a:prstGeom prst="rect">
+            <a:avLst/>
+          </a:prstGeom>
+        </p:spPr>
+      </p:pic>
+    </p:spTree>
+    <p:extLst>
+      <p:ext uri="{BB962C8B-B14F-4D97-AF65-F5344CB8AC3E}">
+        <p14:creationId xmlns:p14="http://schemas.microsoft.com/office/powerpoint/2010/main" val="1450698089"/>
+      </p:ext>
+    </p:extLst>
+  </p:cSld>
+  <p:clrMapOvr>
+    <a:masterClrMapping/>
+  </p:clrMapOvr>
+</p:sld>
+</file>
+
+<file path=ppt/slides/slide16.xml><?xml version="1.0" encoding="utf-8"?>
+<p:sld xmlns:a="http://schemas.openxmlformats.org/drawingml/2006/main" xmlns:r="http://schemas.openxmlformats.org/officeDocument/2006/relationships" xmlns:p="http://schemas.openxmlformats.org/presentationml/2006/main">
+  <p:cSld>
+    <p:spTree>
+      <p:nvGrpSpPr>
+        <p:cNvPr id="1" name=""/>
+        <p:cNvGrpSpPr/>
+        <p:nvPr/>
+      </p:nvGrpSpPr>
+      <p:grpSpPr>
+        <a:xfrm>
+          <a:off x="0" y="0"/>
+          <a:ext cx="0" cy="0"/>
+          <a:chOff x="0" y="0"/>
+          <a:chExt cx="0" cy="0"/>
+        </a:xfrm>
+      </p:grpSpPr>
+      <p:sp>
+        <p:nvSpPr>
+          <p:cNvPr id="2" name="Title 1"/>
+          <p:cNvSpPr>
+            <a:spLocks noGrp="1"/>
+          </p:cNvSpPr>
+          <p:nvPr>
+            <p:ph type="title"/>
+          </p:nvPr>
+        </p:nvSpPr>
+        <p:spPr/>
+        <p:txBody>
+          <a:bodyPr/>
+          <a:lstStyle/>
+          <a:p>
+            <a:r>
+              <a:rPr lang="en-US" dirty="0" smtClean="0"/>
+              <a:t>Rational Unified Process – 2003 </a:t>
+            </a:r>
+            <a:endParaRPr lang="en-US" dirty="0"/>
+          </a:p>
+        </p:txBody>
+      </p:sp>
+      <p:sp>
+        <p:nvSpPr>
+          <p:cNvPr id="4" name="Text Placeholder 3"/>
+          <p:cNvSpPr>
+            <a:spLocks noGrp="1"/>
+          </p:cNvSpPr>
+          <p:nvPr>
+            <p:ph type="body" sz="quarter" idx="10"/>
+          </p:nvPr>
+        </p:nvSpPr>
+        <p:spPr/>
+        <p:txBody>
+          <a:bodyPr/>
+          <a:lstStyle/>
+          <a:p>
+            <a:pPr marL="342900" indent="-342900">
+              <a:buFont typeface="Arial"/>
+              <a:buChar char="•"/>
+            </a:pPr>
+            <a:r>
+              <a:rPr lang="en-US" dirty="0" smtClean="0"/>
+              <a:t>Four phases</a:t>
+            </a:r>
+          </a:p>
+          <a:p>
+            <a:pPr marL="852488" lvl="3" indent="-342900"/>
+            <a:r>
+              <a:rPr lang="en-US" dirty="0" smtClean="0"/>
+              <a:t>Inception</a:t>
+            </a:r>
+          </a:p>
+          <a:p>
+            <a:pPr marL="852488" lvl="3" indent="-342900"/>
+            <a:r>
+              <a:rPr lang="en-US" dirty="0" smtClean="0"/>
+              <a:t>Elaboration</a:t>
+            </a:r>
+          </a:p>
+          <a:p>
+            <a:pPr marL="852488" lvl="3" indent="-342900"/>
+            <a:r>
+              <a:rPr lang="en-US" dirty="0" smtClean="0"/>
+              <a:t>Construction</a:t>
+            </a:r>
+          </a:p>
+          <a:p>
+            <a:pPr marL="852488" lvl="3" indent="-342900"/>
+            <a:r>
+              <a:rPr lang="en-US" dirty="0" smtClean="0"/>
+              <a:t>Transition</a:t>
+            </a:r>
+          </a:p>
+          <a:p>
+            <a:pPr lvl="3" indent="0">
+              <a:buNone/>
+            </a:pPr>
+            <a:endParaRPr lang="en-US" dirty="0" smtClean="0"/>
+          </a:p>
+          <a:p>
+            <a:pPr marL="342900" lvl="2" indent="-342900"/>
+            <a:r>
+              <a:rPr lang="en-US" dirty="0" smtClean="0"/>
+              <a:t>Each phase may have multiple iterations</a:t>
+            </a:r>
+            <a:endParaRPr lang="en-US" dirty="0"/>
+          </a:p>
+        </p:txBody>
+      </p:sp>
+    </p:spTree>
+    <p:extLst>
+      <p:ext uri="{BB962C8B-B14F-4D97-AF65-F5344CB8AC3E}">
+        <p14:creationId xmlns:p14="http://schemas.microsoft.com/office/powerpoint/2010/main" val="3949172482"/>
+      </p:ext>
+    </p:extLst>
+  </p:cSld>
+  <p:clrMapOvr>
+    <a:masterClrMapping/>
+  </p:clrMapOvr>
+</p:sld>
+</file>
+
+<file path=ppt/slides/slide17.xml><?xml version="1.0" encoding="utf-8"?>
+<p:sld xmlns:a="http://schemas.openxmlformats.org/drawingml/2006/main" xmlns:r="http://schemas.openxmlformats.org/officeDocument/2006/relationships" xmlns:p="http://schemas.openxmlformats.org/presentationml/2006/main">
+  <p:cSld>
+    <p:spTree>
+      <p:nvGrpSpPr>
+        <p:cNvPr id="1" name=""/>
+        <p:cNvGrpSpPr/>
+        <p:nvPr/>
+      </p:nvGrpSpPr>
+      <p:grpSpPr>
+        <a:xfrm>
+          <a:off x="0" y="0"/>
+          <a:ext cx="0" cy="0"/>
+          <a:chOff x="0" y="0"/>
+          <a:chExt cx="0" cy="0"/>
+        </a:xfrm>
+      </p:grpSpPr>
+      <p:sp>
+        <p:nvSpPr>
+          <p:cNvPr id="2" name="Title 1"/>
+          <p:cNvSpPr>
+            <a:spLocks noGrp="1"/>
+          </p:cNvSpPr>
+          <p:nvPr>
+            <p:ph type="title"/>
+          </p:nvPr>
+        </p:nvSpPr>
+        <p:spPr/>
+        <p:txBody>
+          <a:bodyPr/>
+          <a:lstStyle/>
+          <a:p>
+            <a:r>
+              <a:rPr lang="en-US" dirty="0" smtClean="0"/>
+              <a:t>The Agile Manifesto – 2001 </a:t>
+            </a:r>
+            <a:endParaRPr lang="en-US" dirty="0"/>
+          </a:p>
+        </p:txBody>
+      </p:sp>
+      <p:sp>
+        <p:nvSpPr>
+          <p:cNvPr id="3" name="Text Placeholder 2"/>
+          <p:cNvSpPr>
+            <a:spLocks noGrp="1"/>
+          </p:cNvSpPr>
+          <p:nvPr>
+            <p:ph type="body" sz="quarter" idx="10"/>
+          </p:nvPr>
+        </p:nvSpPr>
+        <p:spPr/>
+        <p:txBody>
+          <a:bodyPr/>
+          <a:lstStyle/>
+          <a:p>
+            <a:pPr marL="342900" indent="-342900">
+              <a:buFont typeface="Arial"/>
+              <a:buChar char="•"/>
+            </a:pPr>
+            <a:r>
+              <a:rPr lang="en-US" dirty="0" smtClean="0"/>
+              <a:t>Individuals and interactions over processes and tools</a:t>
+            </a:r>
+          </a:p>
+          <a:p>
+            <a:pPr marL="342900" indent="-342900">
+              <a:buFont typeface="Arial"/>
+              <a:buChar char="•"/>
+            </a:pPr>
+            <a:r>
+              <a:rPr lang="en-US" dirty="0" smtClean="0"/>
+              <a:t>Working software over comprehensive documentation</a:t>
+            </a:r>
+          </a:p>
+          <a:p>
+            <a:pPr marL="342900" indent="-342900">
+              <a:buFont typeface="Arial"/>
+              <a:buChar char="•"/>
+            </a:pPr>
+            <a:r>
+              <a:rPr lang="en-US" dirty="0" smtClean="0"/>
+              <a:t>Customer collaboration over contract negotiation</a:t>
+            </a:r>
+          </a:p>
+          <a:p>
+            <a:pPr marL="342900" indent="-342900">
+              <a:buFont typeface="Arial"/>
+              <a:buChar char="•"/>
+            </a:pPr>
+            <a:r>
+              <a:rPr lang="en-US" dirty="0" smtClean="0"/>
+              <a:t>Responding to change over following a plan</a:t>
+            </a:r>
+            <a:endParaRPr lang="en-US" dirty="0"/>
+          </a:p>
+        </p:txBody>
+      </p:sp>
+      <p:pic>
+        <p:nvPicPr>
+          <p:cNvPr id="4" name="Picture 3" descr="dilbertagile.gif"/>
+          <p:cNvPicPr>
+            <a:picLocks noChangeAspect="1"/>
+          </p:cNvPicPr>
+          <p:nvPr/>
+        </p:nvPicPr>
+        <p:blipFill>
+          <a:blip r:embed="rId2">
+            <a:extLst>
+              <a:ext uri="{28A0092B-C50C-407E-A947-70E740481C1C}">
+                <a14:useLocalDpi xmlns:a14="http://schemas.microsoft.com/office/drawing/2010/main" val="0"/>
+              </a:ext>
+            </a:extLst>
+          </a:blip>
+          <a:stretch>
+            <a:fillRect/>
+          </a:stretch>
+        </p:blipFill>
+        <p:spPr>
+          <a:xfrm>
+            <a:off x="3251200" y="4225142"/>
+            <a:ext cx="8128000" cy="2527300"/>
+          </a:xfrm>
+          <a:prstGeom prst="rect">
+            <a:avLst/>
+          </a:prstGeom>
+        </p:spPr>
+      </p:pic>
+    </p:spTree>
+    <p:extLst>
+      <p:ext uri="{BB962C8B-B14F-4D97-AF65-F5344CB8AC3E}">
+        <p14:creationId xmlns:p14="http://schemas.microsoft.com/office/powerpoint/2010/main" val="2539549973"/>
+      </p:ext>
+    </p:extLst>
+  </p:cSld>
+  <p:clrMapOvr>
+    <a:masterClrMapping/>
+  </p:clrMapOvr>
+</p:sld>
+</file>
+
+<file path=ppt/slides/slide18.xml><?xml version="1.0" encoding="utf-8"?>
+<p:sld xmlns:a="http://schemas.openxmlformats.org/drawingml/2006/main" xmlns:r="http://schemas.openxmlformats.org/officeDocument/2006/relationships" xmlns:p="http://schemas.openxmlformats.org/presentationml/2006/main">
+  <p:cSld>
+    <p:spTree>
+      <p:nvGrpSpPr>
+        <p:cNvPr id="1" name=""/>
+        <p:cNvGrpSpPr/>
+        <p:nvPr/>
+      </p:nvGrpSpPr>
+      <p:grpSpPr>
+        <a:xfrm>
+          <a:off x="0" y="0"/>
+          <a:ext cx="0" cy="0"/>
+          <a:chOff x="0" y="0"/>
+          <a:chExt cx="0" cy="0"/>
+        </a:xfrm>
+      </p:grpSpPr>
+      <p:sp>
+        <p:nvSpPr>
+          <p:cNvPr id="2" name="Title 1"/>
+          <p:cNvSpPr>
+            <a:spLocks noGrp="1"/>
+          </p:cNvSpPr>
+          <p:nvPr>
+            <p:ph type="title"/>
+          </p:nvPr>
+        </p:nvSpPr>
+        <p:spPr/>
+        <p:txBody>
+          <a:bodyPr/>
+          <a:lstStyle/>
+          <a:p>
+            <a:r>
+              <a:rPr lang="en-US" dirty="0" smtClean="0"/>
+              <a:t>Exercise</a:t>
+            </a:r>
+            <a:endParaRPr lang="en-US" dirty="0"/>
+          </a:p>
+        </p:txBody>
+      </p:sp>
+      <p:sp>
+        <p:nvSpPr>
+          <p:cNvPr id="3" name="Text Placeholder 2"/>
+          <p:cNvSpPr>
+            <a:spLocks noGrp="1"/>
+          </p:cNvSpPr>
+          <p:nvPr>
+            <p:ph type="body" sz="quarter" idx="10"/>
+          </p:nvPr>
+        </p:nvSpPr>
+        <p:spPr/>
+        <p:txBody>
+          <a:bodyPr/>
+          <a:lstStyle/>
+          <a:p>
+            <a:pPr marL="342900" indent="-342900">
+              <a:buFont typeface="Arial"/>
+              <a:buChar char="•"/>
+            </a:pPr>
+            <a:r>
+              <a:rPr lang="en-US" dirty="0" smtClean="0"/>
+              <a:t>Identify the ten applications you think are most important.</a:t>
+            </a:r>
+          </a:p>
+          <a:p>
+            <a:pPr marL="342900" indent="-342900">
+              <a:buFont typeface="Arial"/>
+              <a:buChar char="•"/>
+            </a:pPr>
+            <a:endParaRPr lang="en-US" dirty="0"/>
+          </a:p>
+          <a:p>
+            <a:pPr marL="342900" indent="-342900">
+              <a:buFont typeface="Arial"/>
+              <a:buChar char="•"/>
+            </a:pPr>
+            <a:r>
+              <a:rPr lang="en-US" dirty="0" smtClean="0"/>
+              <a:t>For each, do you think agile would be an appropriate software </a:t>
+            </a:r>
+            <a:r>
+              <a:rPr lang="en-US" smtClean="0"/>
+              <a:t>development methodology?</a:t>
+            </a:r>
+            <a:endParaRPr lang="en-US" dirty="0"/>
+          </a:p>
+        </p:txBody>
+      </p:sp>
+    </p:spTree>
+    <p:extLst>
+      <p:ext uri="{BB962C8B-B14F-4D97-AF65-F5344CB8AC3E}">
+        <p14:creationId xmlns:p14="http://schemas.microsoft.com/office/powerpoint/2010/main" val="2041610929"/>
+      </p:ext>
+    </p:extLst>
+  </p:cSld>
+  <p:clrMapOvr>
+    <a:masterClrMapping/>
+  </p:clrMapOvr>
+</p:sld>
+</file>
+
 <file path=ppt/slides/slide2.xml><?xml version="1.0" encoding="utf-8"?>
 <p:sld xmlns:a="http://schemas.openxmlformats.org/drawingml/2006/main" xmlns:r="http://schemas.openxmlformats.org/officeDocument/2006/relationships" xmlns:p="http://schemas.openxmlformats.org/presentationml/2006/main">
   <p:cSld>
@@ -3707,7 +4727,6 @@
               <a:rPr lang="en-US" dirty="0"/>
               <a:t>	</a:t>
             </a:r>
-            <a:endParaRPr lang="en-US" dirty="0"/>
           </a:p>
         </p:txBody>
       </p:sp>
@@ -3850,7 +4869,6 @@
               <a:rPr lang="en-US" dirty="0"/>
               <a:t>	</a:t>
             </a:r>
-            <a:endParaRPr lang="en-US" dirty="0"/>
           </a:p>
         </p:txBody>
       </p:sp>

</xml_diff>